<commit_message>
post for the tda workshop
</commit_message>
<xml_diff>
--- a/tex_tda2016/figures/overview.pptx
+++ b/tex_tda2016/figures/overview.pptx
@@ -6,6 +6,7 @@
   </p:sldMasterIdLst>
   <p:sldIdLst>
     <p:sldId id="256" r:id="rId2"/>
+    <p:sldId id="257" r:id="rId3"/>
   </p:sldIdLst>
   <p:sldSz cx="9144000" cy="6858000" type="screen4x3"/>
   <p:notesSz cx="6858000" cy="9144000"/>
@@ -288,7 +289,7 @@
           <a:p>
             <a:fld id="{6C579F98-982D-496C-8BA2-13D96E826B65}" type="datetimeFigureOut">
               <a:rPr lang="en-US" smtClean="0"/>
-              <a:t>16/10/20</a:t>
+              <a:t>16/11/28</a:t>
             </a:fld>
             <a:endParaRPr lang="en-US"/>
           </a:p>
@@ -458,7 +459,7 @@
           <a:p>
             <a:fld id="{6C579F98-982D-496C-8BA2-13D96E826B65}" type="datetimeFigureOut">
               <a:rPr lang="en-US" smtClean="0"/>
-              <a:t>16/10/20</a:t>
+              <a:t>16/11/28</a:t>
             </a:fld>
             <a:endParaRPr lang="en-US"/>
           </a:p>
@@ -638,7 +639,7 @@
           <a:p>
             <a:fld id="{6C579F98-982D-496C-8BA2-13D96E826B65}" type="datetimeFigureOut">
               <a:rPr lang="en-US" smtClean="0"/>
-              <a:t>16/10/20</a:t>
+              <a:t>16/11/28</a:t>
             </a:fld>
             <a:endParaRPr lang="en-US"/>
           </a:p>
@@ -808,7 +809,7 @@
           <a:p>
             <a:fld id="{6C579F98-982D-496C-8BA2-13D96E826B65}" type="datetimeFigureOut">
               <a:rPr lang="en-US" smtClean="0"/>
-              <a:t>16/10/20</a:t>
+              <a:t>16/11/28</a:t>
             </a:fld>
             <a:endParaRPr lang="en-US"/>
           </a:p>
@@ -1054,7 +1055,7 @@
           <a:p>
             <a:fld id="{6C579F98-982D-496C-8BA2-13D96E826B65}" type="datetimeFigureOut">
               <a:rPr lang="en-US" smtClean="0"/>
-              <a:t>16/10/20</a:t>
+              <a:t>16/11/28</a:t>
             </a:fld>
             <a:endParaRPr lang="en-US"/>
           </a:p>
@@ -1342,7 +1343,7 @@
           <a:p>
             <a:fld id="{6C579F98-982D-496C-8BA2-13D96E826B65}" type="datetimeFigureOut">
               <a:rPr lang="en-US" smtClean="0"/>
-              <a:t>16/10/20</a:t>
+              <a:t>16/11/28</a:t>
             </a:fld>
             <a:endParaRPr lang="en-US"/>
           </a:p>
@@ -1764,7 +1765,7 @@
           <a:p>
             <a:fld id="{6C579F98-982D-496C-8BA2-13D96E826B65}" type="datetimeFigureOut">
               <a:rPr lang="en-US" smtClean="0"/>
-              <a:t>16/10/20</a:t>
+              <a:t>16/11/28</a:t>
             </a:fld>
             <a:endParaRPr lang="en-US"/>
           </a:p>
@@ -1882,7 +1883,7 @@
           <a:p>
             <a:fld id="{6C579F98-982D-496C-8BA2-13D96E826B65}" type="datetimeFigureOut">
               <a:rPr lang="en-US" smtClean="0"/>
-              <a:t>16/10/20</a:t>
+              <a:t>16/11/28</a:t>
             </a:fld>
             <a:endParaRPr lang="en-US"/>
           </a:p>
@@ -1977,7 +1978,7 @@
           <a:p>
             <a:fld id="{6C579F98-982D-496C-8BA2-13D96E826B65}" type="datetimeFigureOut">
               <a:rPr lang="en-US" smtClean="0"/>
-              <a:t>16/10/20</a:t>
+              <a:t>16/11/28</a:t>
             </a:fld>
             <a:endParaRPr lang="en-US"/>
           </a:p>
@@ -2254,7 +2255,7 @@
           <a:p>
             <a:fld id="{6C579F98-982D-496C-8BA2-13D96E826B65}" type="datetimeFigureOut">
               <a:rPr lang="en-US" smtClean="0"/>
-              <a:t>16/10/20</a:t>
+              <a:t>16/11/28</a:t>
             </a:fld>
             <a:endParaRPr lang="en-US"/>
           </a:p>
@@ -2507,7 +2508,7 @@
           <a:p>
             <a:fld id="{6C579F98-982D-496C-8BA2-13D96E826B65}" type="datetimeFigureOut">
               <a:rPr lang="en-US" smtClean="0"/>
-              <a:t>16/10/20</a:t>
+              <a:t>16/11/28</a:t>
             </a:fld>
             <a:endParaRPr lang="en-US"/>
           </a:p>
@@ -2720,7 +2721,7 @@
           <a:p>
             <a:fld id="{6C579F98-982D-496C-8BA2-13D96E826B65}" type="datetimeFigureOut">
               <a:rPr lang="en-US" smtClean="0"/>
-              <a:t>16/10/20</a:t>
+              <a:t>16/11/28</a:t>
             </a:fld>
             <a:endParaRPr lang="en-US"/>
           </a:p>
@@ -3396,13 +3397,6 @@
               </a:rPr>
               <a:t>Source </a:t>
             </a:r>
-            <a:r>
-              <a:rPr lang="en-US" sz="1600" b="1" dirty="0" smtClean="0">
-                <a:latin typeface="Arial"/>
-                <a:cs typeface="Arial"/>
-              </a:rPr>
-              <a:t/>
-            </a:r>
             <a:br>
               <a:rPr lang="en-US" sz="1600" b="1" dirty="0" smtClean="0">
                 <a:latin typeface="Arial"/>
@@ -3414,14 +3408,7 @@
                 <a:latin typeface="Arial"/>
                 <a:cs typeface="Arial"/>
               </a:rPr>
-              <a:t>Code </a:t>
-            </a:r>
-            <a:r>
-              <a:rPr lang="en-US" sz="1600" b="1" dirty="0" smtClean="0">
-                <a:latin typeface="Arial"/>
-                <a:cs typeface="Arial"/>
-              </a:rPr>
-              <a:t>Repository</a:t>
+              <a:t>Code Repository</a:t>
             </a:r>
             <a:endParaRPr lang="en-US" sz="1600" b="1" dirty="0">
               <a:latin typeface="Arial"/>
@@ -3484,14 +3471,7 @@
                 <a:latin typeface="Arial"/>
                 <a:cs typeface="Arial"/>
               </a:rPr>
-              <a:t> (Details in </a:t>
-            </a:r>
-            <a:r>
-              <a:rPr lang="en-US" sz="1600" b="1" dirty="0" smtClean="0">
-                <a:latin typeface="Arial"/>
-                <a:cs typeface="Arial"/>
-              </a:rPr>
-              <a:t>[7] )</a:t>
+              <a:t> (Details in [7] )</a:t>
             </a:r>
             <a:endParaRPr lang="en-US" sz="1600" b="1" dirty="0">
               <a:latin typeface="Arial"/>
@@ -4236,6 +4216,1148 @@
 </p:sld>
 </file>
 
+<file path=ppt/slides/slide2.xml><?xml version="1.0" encoding="utf-8"?>
+<p:sld xmlns:a="http://schemas.openxmlformats.org/drawingml/2006/main" xmlns:r="http://schemas.openxmlformats.org/officeDocument/2006/relationships" xmlns:p="http://schemas.openxmlformats.org/presentationml/2006/main">
+  <p:cSld>
+    <p:spTree>
+      <p:nvGrpSpPr>
+        <p:cNvPr id="1" name=""/>
+        <p:cNvGrpSpPr/>
+        <p:nvPr/>
+      </p:nvGrpSpPr>
+      <p:grpSpPr>
+        <a:xfrm>
+          <a:off x="0" y="0"/>
+          <a:ext cx="0" cy="0"/>
+          <a:chOff x="0" y="0"/>
+          <a:chExt cx="0" cy="0"/>
+        </a:xfrm>
+      </p:grpSpPr>
+      <p:sp>
+        <p:nvSpPr>
+          <p:cNvPr id="5" name="Rectangle 4"/>
+          <p:cNvSpPr/>
+          <p:nvPr/>
+        </p:nvSpPr>
+        <p:spPr>
+          <a:xfrm>
+            <a:off x="1650840" y="2667000"/>
+            <a:ext cx="1550345" cy="1219200"/>
+          </a:xfrm>
+          <a:prstGeom prst="rect">
+            <a:avLst/>
+          </a:prstGeom>
+          <a:noFill/>
+          <a:ln>
+            <a:solidFill>
+              <a:schemeClr val="tx1"/>
+            </a:solidFill>
+          </a:ln>
+        </p:spPr>
+        <p:style>
+          <a:lnRef idx="2">
+            <a:schemeClr val="accent1">
+              <a:shade val="50000"/>
+            </a:schemeClr>
+          </a:lnRef>
+          <a:fillRef idx="1">
+            <a:schemeClr val="accent1"/>
+          </a:fillRef>
+          <a:effectRef idx="0">
+            <a:schemeClr val="accent1"/>
+          </a:effectRef>
+          <a:fontRef idx="minor">
+            <a:schemeClr val="lt1"/>
+          </a:fontRef>
+        </p:style>
+        <p:txBody>
+          <a:bodyPr rtlCol="0" anchor="ctr"/>
+          <a:lstStyle/>
+          <a:p>
+            <a:pPr algn="ctr"/>
+            <a:endParaRPr lang="en-US" sz="1400">
+              <a:latin typeface="Arial"/>
+              <a:cs typeface="Arial"/>
+            </a:endParaRPr>
+          </a:p>
+        </p:txBody>
+      </p:sp>
+      <p:sp>
+        <p:nvSpPr>
+          <p:cNvPr id="6" name="Rectangle 5"/>
+          <p:cNvSpPr/>
+          <p:nvPr/>
+        </p:nvSpPr>
+        <p:spPr>
+          <a:xfrm>
+            <a:off x="3478855" y="2667000"/>
+            <a:ext cx="1550345" cy="1219200"/>
+          </a:xfrm>
+          <a:prstGeom prst="rect">
+            <a:avLst/>
+          </a:prstGeom>
+          <a:noFill/>
+          <a:ln>
+            <a:solidFill>
+              <a:schemeClr val="tx1"/>
+            </a:solidFill>
+          </a:ln>
+        </p:spPr>
+        <p:style>
+          <a:lnRef idx="2">
+            <a:schemeClr val="accent1">
+              <a:shade val="50000"/>
+            </a:schemeClr>
+          </a:lnRef>
+          <a:fillRef idx="1">
+            <a:schemeClr val="accent1"/>
+          </a:fillRef>
+          <a:effectRef idx="0">
+            <a:schemeClr val="accent1"/>
+          </a:effectRef>
+          <a:fontRef idx="minor">
+            <a:schemeClr val="lt1"/>
+          </a:fontRef>
+        </p:style>
+        <p:txBody>
+          <a:bodyPr rtlCol="0" anchor="ctr"/>
+          <a:lstStyle/>
+          <a:p>
+            <a:pPr algn="ctr"/>
+            <a:endParaRPr lang="en-US" sz="1400">
+              <a:latin typeface="Arial"/>
+              <a:cs typeface="Arial"/>
+            </a:endParaRPr>
+          </a:p>
+        </p:txBody>
+      </p:sp>
+      <p:sp>
+        <p:nvSpPr>
+          <p:cNvPr id="7" name="Rectangle 6"/>
+          <p:cNvSpPr/>
+          <p:nvPr/>
+        </p:nvSpPr>
+        <p:spPr>
+          <a:xfrm>
+            <a:off x="5307655" y="2667000"/>
+            <a:ext cx="1550345" cy="1219200"/>
+          </a:xfrm>
+          <a:prstGeom prst="rect">
+            <a:avLst/>
+          </a:prstGeom>
+          <a:noFill/>
+          <a:ln>
+            <a:solidFill>
+              <a:schemeClr val="tx1"/>
+            </a:solidFill>
+          </a:ln>
+        </p:spPr>
+        <p:style>
+          <a:lnRef idx="2">
+            <a:schemeClr val="accent1">
+              <a:shade val="50000"/>
+            </a:schemeClr>
+          </a:lnRef>
+          <a:fillRef idx="1">
+            <a:schemeClr val="accent1"/>
+          </a:fillRef>
+          <a:effectRef idx="0">
+            <a:schemeClr val="accent1"/>
+          </a:effectRef>
+          <a:fontRef idx="minor">
+            <a:schemeClr val="lt1"/>
+          </a:fontRef>
+        </p:style>
+        <p:txBody>
+          <a:bodyPr rtlCol="0" anchor="ctr"/>
+          <a:lstStyle/>
+          <a:p>
+            <a:pPr algn="ctr"/>
+            <a:endParaRPr lang="en-US" sz="1400">
+              <a:latin typeface="Arial"/>
+              <a:cs typeface="Arial"/>
+            </a:endParaRPr>
+          </a:p>
+        </p:txBody>
+      </p:sp>
+      <p:sp>
+        <p:nvSpPr>
+          <p:cNvPr id="8" name="Can 7"/>
+          <p:cNvSpPr/>
+          <p:nvPr/>
+        </p:nvSpPr>
+        <p:spPr>
+          <a:xfrm>
+            <a:off x="473" y="2667000"/>
+            <a:ext cx="1323509" cy="1219200"/>
+          </a:xfrm>
+          <a:prstGeom prst="can">
+            <a:avLst/>
+          </a:prstGeom>
+          <a:noFill/>
+          <a:ln>
+            <a:solidFill>
+              <a:schemeClr val="tx1"/>
+            </a:solidFill>
+          </a:ln>
+        </p:spPr>
+        <p:style>
+          <a:lnRef idx="2">
+            <a:schemeClr val="accent1">
+              <a:shade val="50000"/>
+            </a:schemeClr>
+          </a:lnRef>
+          <a:fillRef idx="1">
+            <a:schemeClr val="accent1"/>
+          </a:fillRef>
+          <a:effectRef idx="0">
+            <a:schemeClr val="accent1"/>
+          </a:effectRef>
+          <a:fontRef idx="minor">
+            <a:schemeClr val="lt1"/>
+          </a:fontRef>
+        </p:style>
+        <p:txBody>
+          <a:bodyPr rtlCol="0" anchor="ctr"/>
+          <a:lstStyle/>
+          <a:p>
+            <a:pPr algn="ctr"/>
+            <a:endParaRPr lang="en-US" sz="1400">
+              <a:latin typeface="Arial"/>
+              <a:cs typeface="Arial"/>
+            </a:endParaRPr>
+          </a:p>
+        </p:txBody>
+      </p:sp>
+      <p:cxnSp>
+        <p:nvCxnSpPr>
+          <p:cNvPr id="10" name="Straight Arrow Connector 9"/>
+          <p:cNvCxnSpPr>
+            <a:stCxn id="5" idx="3"/>
+            <a:endCxn id="6" idx="1"/>
+          </p:cNvCxnSpPr>
+          <p:nvPr/>
+        </p:nvCxnSpPr>
+        <p:spPr>
+          <a:xfrm>
+            <a:off x="3201185" y="3276600"/>
+            <a:ext cx="277670" cy="0"/>
+          </a:xfrm>
+          <a:prstGeom prst="straightConnector1">
+            <a:avLst/>
+          </a:prstGeom>
+          <a:ln w="25400">
+            <a:solidFill>
+              <a:schemeClr val="tx1"/>
+            </a:solidFill>
+            <a:tailEnd type="arrow"/>
+          </a:ln>
+        </p:spPr>
+        <p:style>
+          <a:lnRef idx="1">
+            <a:schemeClr val="accent1"/>
+          </a:lnRef>
+          <a:fillRef idx="0">
+            <a:schemeClr val="accent1"/>
+          </a:fillRef>
+          <a:effectRef idx="0">
+            <a:schemeClr val="accent1"/>
+          </a:effectRef>
+          <a:fontRef idx="minor">
+            <a:schemeClr val="tx1"/>
+          </a:fontRef>
+        </p:style>
+      </p:cxnSp>
+      <p:sp>
+        <p:nvSpPr>
+          <p:cNvPr id="17" name="TextBox 16"/>
+          <p:cNvSpPr txBox="1"/>
+          <p:nvPr/>
+        </p:nvSpPr>
+        <p:spPr>
+          <a:xfrm>
+            <a:off x="0" y="2971800"/>
+            <a:ext cx="1318680" cy="830997"/>
+          </a:xfrm>
+          <a:prstGeom prst="rect">
+            <a:avLst/>
+          </a:prstGeom>
+          <a:noFill/>
+        </p:spPr>
+        <p:txBody>
+          <a:bodyPr wrap="square" rtlCol="0">
+            <a:spAutoFit/>
+          </a:bodyPr>
+          <a:lstStyle/>
+          <a:p>
+            <a:pPr algn="ctr"/>
+            <a:r>
+              <a:rPr lang="en-US" sz="1600" b="1" dirty="0" smtClean="0">
+                <a:latin typeface="Arial"/>
+                <a:cs typeface="Arial"/>
+              </a:rPr>
+              <a:t>Source </a:t>
+            </a:r>
+            <a:br>
+              <a:rPr lang="en-US" sz="1600" b="1" dirty="0" smtClean="0">
+                <a:latin typeface="Arial"/>
+                <a:cs typeface="Arial"/>
+              </a:rPr>
+            </a:br>
+            <a:r>
+              <a:rPr lang="en-US" sz="1600" b="1" dirty="0" smtClean="0">
+                <a:latin typeface="Arial"/>
+                <a:cs typeface="Arial"/>
+              </a:rPr>
+              <a:t>Code Repository</a:t>
+            </a:r>
+            <a:endParaRPr lang="en-US" sz="1600" b="1" dirty="0">
+              <a:latin typeface="Arial"/>
+              <a:cs typeface="Arial"/>
+            </a:endParaRPr>
+          </a:p>
+        </p:txBody>
+      </p:sp>
+      <p:sp>
+        <p:nvSpPr>
+          <p:cNvPr id="18" name="TextBox 17"/>
+          <p:cNvSpPr txBox="1"/>
+          <p:nvPr/>
+        </p:nvSpPr>
+        <p:spPr>
+          <a:xfrm>
+            <a:off x="1524000" y="2867527"/>
+            <a:ext cx="1796991" cy="830997"/>
+          </a:xfrm>
+          <a:prstGeom prst="rect">
+            <a:avLst/>
+          </a:prstGeom>
+          <a:noFill/>
+        </p:spPr>
+        <p:txBody>
+          <a:bodyPr wrap="square" rtlCol="0">
+            <a:spAutoFit/>
+          </a:bodyPr>
+          <a:lstStyle/>
+          <a:p>
+            <a:pPr algn="ctr"/>
+            <a:r>
+              <a:rPr lang="en-US" sz="1600" b="1" dirty="0" smtClean="0">
+                <a:latin typeface="Arial"/>
+                <a:cs typeface="Arial"/>
+              </a:rPr>
+              <a:t>SATD</a:t>
+            </a:r>
+            <a:br>
+              <a:rPr lang="en-US" sz="1600" b="1" dirty="0" smtClean="0">
+                <a:latin typeface="Arial"/>
+                <a:cs typeface="Arial"/>
+              </a:rPr>
+            </a:br>
+            <a:r>
+              <a:rPr lang="en-US" sz="1600" b="1" dirty="0" smtClean="0">
+                <a:latin typeface="Arial"/>
+                <a:cs typeface="Arial"/>
+              </a:rPr>
+              <a:t>Extraction</a:t>
+            </a:r>
+            <a:br>
+              <a:rPr lang="en-US" sz="1600" b="1" dirty="0" smtClean="0">
+                <a:latin typeface="Arial"/>
+                <a:cs typeface="Arial"/>
+              </a:rPr>
+            </a:br>
+            <a:r>
+              <a:rPr lang="en-US" sz="1600" b="1" dirty="0" smtClean="0">
+                <a:latin typeface="Arial"/>
+                <a:cs typeface="Arial"/>
+              </a:rPr>
+              <a:t> (Details in [7] )</a:t>
+            </a:r>
+            <a:endParaRPr lang="en-US" sz="1600" b="1" dirty="0">
+              <a:latin typeface="Arial"/>
+              <a:cs typeface="Arial"/>
+            </a:endParaRPr>
+          </a:p>
+        </p:txBody>
+      </p:sp>
+      <p:sp>
+        <p:nvSpPr>
+          <p:cNvPr id="19" name="TextBox 18"/>
+          <p:cNvSpPr txBox="1"/>
+          <p:nvPr/>
+        </p:nvSpPr>
+        <p:spPr>
+          <a:xfrm>
+            <a:off x="3429000" y="2732782"/>
+            <a:ext cx="1676400" cy="1077218"/>
+          </a:xfrm>
+          <a:prstGeom prst="rect">
+            <a:avLst/>
+          </a:prstGeom>
+          <a:noFill/>
+        </p:spPr>
+        <p:txBody>
+          <a:bodyPr wrap="square" rtlCol="0">
+            <a:spAutoFit/>
+          </a:bodyPr>
+          <a:lstStyle/>
+          <a:p>
+            <a:pPr algn="ctr"/>
+            <a:r>
+              <a:rPr lang="en-US" sz="1600" b="1" dirty="0" smtClean="0">
+                <a:latin typeface="Arial"/>
+                <a:cs typeface="Arial"/>
+              </a:rPr>
+              <a:t>Identifying</a:t>
+            </a:r>
+            <a:br>
+              <a:rPr lang="en-US" sz="1600" b="1" dirty="0" smtClean="0">
+                <a:latin typeface="Arial"/>
+                <a:cs typeface="Arial"/>
+              </a:rPr>
+            </a:br>
+            <a:r>
+              <a:rPr lang="en-US" sz="1600" b="1" dirty="0" smtClean="0">
+                <a:latin typeface="Arial"/>
+                <a:cs typeface="Arial"/>
+              </a:rPr>
+              <a:t>SATD Introduction and Removal</a:t>
+            </a:r>
+            <a:endParaRPr lang="en-US" sz="1600" b="1" dirty="0">
+              <a:latin typeface="Arial"/>
+              <a:cs typeface="Arial"/>
+            </a:endParaRPr>
+          </a:p>
+        </p:txBody>
+      </p:sp>
+      <p:sp>
+        <p:nvSpPr>
+          <p:cNvPr id="20" name="TextBox 19"/>
+          <p:cNvSpPr txBox="1"/>
+          <p:nvPr/>
+        </p:nvSpPr>
+        <p:spPr>
+          <a:xfrm>
+            <a:off x="5307655" y="2743200"/>
+            <a:ext cx="1524002" cy="1077218"/>
+          </a:xfrm>
+          <a:prstGeom prst="rect">
+            <a:avLst/>
+          </a:prstGeom>
+          <a:noFill/>
+        </p:spPr>
+        <p:txBody>
+          <a:bodyPr wrap="square" rtlCol="0">
+            <a:spAutoFit/>
+          </a:bodyPr>
+          <a:lstStyle/>
+          <a:p>
+            <a:pPr algn="ctr"/>
+            <a:r>
+              <a:rPr lang="en-US" sz="1600" b="1" dirty="0" smtClean="0">
+                <a:latin typeface="Arial"/>
+                <a:cs typeface="Arial"/>
+              </a:rPr>
+              <a:t>Determining</a:t>
+            </a:r>
+            <a:br>
+              <a:rPr lang="en-US" sz="1600" b="1" dirty="0" smtClean="0">
+                <a:latin typeface="Arial"/>
+                <a:cs typeface="Arial"/>
+              </a:rPr>
+            </a:br>
+            <a:r>
+              <a:rPr lang="en-US" sz="1600" b="1" dirty="0" smtClean="0">
+                <a:latin typeface="Arial"/>
+                <a:cs typeface="Arial"/>
+              </a:rPr>
+              <a:t>Metrics that </a:t>
+            </a:r>
+            <a:br>
+              <a:rPr lang="en-US" sz="1600" b="1" dirty="0" smtClean="0">
+                <a:latin typeface="Arial"/>
+                <a:cs typeface="Arial"/>
+              </a:rPr>
+            </a:br>
+            <a:r>
+              <a:rPr lang="en-US" sz="1600" b="1" dirty="0" smtClean="0">
+                <a:latin typeface="Arial"/>
+                <a:cs typeface="Arial"/>
+              </a:rPr>
+              <a:t>Measure </a:t>
+            </a:r>
+            <a:br>
+              <a:rPr lang="en-US" sz="1600" b="1" dirty="0" smtClean="0">
+                <a:latin typeface="Arial"/>
+                <a:cs typeface="Arial"/>
+              </a:rPr>
+            </a:br>
+            <a:r>
+              <a:rPr lang="en-US" sz="1600" b="1" dirty="0" smtClean="0">
+                <a:latin typeface="Arial"/>
+                <a:cs typeface="Arial"/>
+              </a:rPr>
+              <a:t>Interest</a:t>
+            </a:r>
+            <a:endParaRPr lang="en-US" sz="1600" b="1" dirty="0">
+              <a:latin typeface="Arial"/>
+              <a:cs typeface="Arial"/>
+            </a:endParaRPr>
+          </a:p>
+        </p:txBody>
+      </p:sp>
+      <p:cxnSp>
+        <p:nvCxnSpPr>
+          <p:cNvPr id="25" name="Straight Arrow Connector 9"/>
+          <p:cNvCxnSpPr/>
+          <p:nvPr/>
+        </p:nvCxnSpPr>
+        <p:spPr>
+          <a:xfrm>
+            <a:off x="1323982" y="3276600"/>
+            <a:ext cx="316800" cy="0"/>
+          </a:xfrm>
+          <a:prstGeom prst="straightConnector1">
+            <a:avLst/>
+          </a:prstGeom>
+          <a:ln w="25400">
+            <a:solidFill>
+              <a:schemeClr val="tx1"/>
+            </a:solidFill>
+            <a:tailEnd type="arrow"/>
+          </a:ln>
+        </p:spPr>
+        <p:style>
+          <a:lnRef idx="1">
+            <a:schemeClr val="accent1"/>
+          </a:lnRef>
+          <a:fillRef idx="0">
+            <a:schemeClr val="accent1"/>
+          </a:fillRef>
+          <a:effectRef idx="0">
+            <a:schemeClr val="accent1"/>
+          </a:effectRef>
+          <a:fontRef idx="minor">
+            <a:schemeClr val="tx1"/>
+          </a:fontRef>
+        </p:style>
+      </p:cxnSp>
+      <p:sp>
+        <p:nvSpPr>
+          <p:cNvPr id="26" name="Rectangle 6"/>
+          <p:cNvSpPr/>
+          <p:nvPr/>
+        </p:nvSpPr>
+        <p:spPr>
+          <a:xfrm>
+            <a:off x="7136455" y="2667000"/>
+            <a:ext cx="1550345" cy="1219200"/>
+          </a:xfrm>
+          <a:prstGeom prst="rect">
+            <a:avLst/>
+          </a:prstGeom>
+          <a:noFill/>
+          <a:ln>
+            <a:solidFill>
+              <a:schemeClr val="tx1"/>
+            </a:solidFill>
+          </a:ln>
+        </p:spPr>
+        <p:style>
+          <a:lnRef idx="2">
+            <a:schemeClr val="accent1">
+              <a:shade val="50000"/>
+            </a:schemeClr>
+          </a:lnRef>
+          <a:fillRef idx="1">
+            <a:schemeClr val="accent1"/>
+          </a:fillRef>
+          <a:effectRef idx="0">
+            <a:schemeClr val="accent1"/>
+          </a:effectRef>
+          <a:fontRef idx="minor">
+            <a:schemeClr val="lt1"/>
+          </a:fontRef>
+        </p:style>
+        <p:txBody>
+          <a:bodyPr rtlCol="0" anchor="ctr"/>
+          <a:lstStyle/>
+          <a:p>
+            <a:pPr algn="ctr"/>
+            <a:endParaRPr lang="en-US" sz="1400">
+              <a:latin typeface="Arial"/>
+              <a:cs typeface="Arial"/>
+            </a:endParaRPr>
+          </a:p>
+        </p:txBody>
+      </p:sp>
+      <p:sp>
+        <p:nvSpPr>
+          <p:cNvPr id="28" name="TextBox 19"/>
+          <p:cNvSpPr txBox="1"/>
+          <p:nvPr/>
+        </p:nvSpPr>
+        <p:spPr>
+          <a:xfrm>
+            <a:off x="7145275" y="2978986"/>
+            <a:ext cx="1524002" cy="584776"/>
+          </a:xfrm>
+          <a:prstGeom prst="rect">
+            <a:avLst/>
+          </a:prstGeom>
+          <a:noFill/>
+        </p:spPr>
+        <p:txBody>
+          <a:bodyPr wrap="square" rtlCol="0">
+            <a:spAutoFit/>
+          </a:bodyPr>
+          <a:lstStyle/>
+          <a:p>
+            <a:pPr algn="ctr"/>
+            <a:r>
+              <a:rPr lang="en-US" sz="1600" b="1" dirty="0" smtClean="0">
+                <a:latin typeface="Arial"/>
+                <a:cs typeface="Arial"/>
+              </a:rPr>
+              <a:t>Calculating</a:t>
+            </a:r>
+            <a:br>
+              <a:rPr lang="en-US" sz="1600" b="1" dirty="0" smtClean="0">
+                <a:latin typeface="Arial"/>
+                <a:cs typeface="Arial"/>
+              </a:rPr>
+            </a:br>
+            <a:r>
+              <a:rPr lang="en-US" sz="1600" b="1" dirty="0" smtClean="0">
+                <a:latin typeface="Arial"/>
+                <a:cs typeface="Arial"/>
+              </a:rPr>
+              <a:t>Interest</a:t>
+            </a:r>
+            <a:endParaRPr lang="en-US" sz="1600" b="1" dirty="0">
+              <a:latin typeface="Arial"/>
+              <a:cs typeface="Arial"/>
+            </a:endParaRPr>
+          </a:p>
+        </p:txBody>
+      </p:sp>
+      <p:graphicFrame>
+        <p:nvGraphicFramePr>
+          <p:cNvPr id="9" name="表 8"/>
+          <p:cNvGraphicFramePr>
+            <a:graphicFrameLocks noGrp="1"/>
+          </p:cNvGraphicFramePr>
+          <p:nvPr>
+            <p:extLst>
+              <p:ext uri="{D42A27DB-BD31-4B8C-83A1-F6EECF244321}">
+                <p14:modId xmlns:p14="http://schemas.microsoft.com/office/powerpoint/2010/main" val="3333533402"/>
+              </p:ext>
+            </p:extLst>
+          </p:nvPr>
+        </p:nvGraphicFramePr>
+        <p:xfrm>
+          <a:off x="8991600" y="2590800"/>
+          <a:ext cx="2209800" cy="1363080"/>
+        </p:xfrm>
+        <a:graphic>
+          <a:graphicData uri="http://schemas.openxmlformats.org/drawingml/2006/table">
+            <a:tbl>
+              <a:tblPr firstRow="1" bandRow="1">
+                <a:tableStyleId>{7E9639D4-E3E2-4D34-9284-5A2195B3D0D7}</a:tableStyleId>
+              </a:tblPr>
+              <a:tblGrid>
+                <a:gridCol w="1447800"/>
+                <a:gridCol w="762000"/>
+              </a:tblGrid>
+              <a:tr h="245520">
+                <a:tc>
+                  <a:txBody>
+                    <a:bodyPr/>
+                    <a:lstStyle/>
+                    <a:p>
+                      <a:pPr>
+                        <a:lnSpc>
+                          <a:spcPts val="1140"/>
+                        </a:lnSpc>
+                      </a:pPr>
+                      <a:r>
+                        <a:rPr kumimoji="1" lang="en-US" altLang="ja-JP" sz="1200" dirty="0" smtClean="0">
+                          <a:latin typeface="Arial"/>
+                          <a:cs typeface="Arial"/>
+                        </a:rPr>
+                        <a:t>File</a:t>
+                      </a:r>
+                      <a:endParaRPr kumimoji="1" lang="ja-JP" altLang="en-US" sz="1200" dirty="0">
+                        <a:latin typeface="Arial"/>
+                        <a:cs typeface="Arial"/>
+                      </a:endParaRPr>
+                    </a:p>
+                  </a:txBody>
+                  <a:tcPr/>
+                </a:tc>
+                <a:tc>
+                  <a:txBody>
+                    <a:bodyPr/>
+                    <a:lstStyle/>
+                    <a:p>
+                      <a:pPr>
+                        <a:lnSpc>
+                          <a:spcPts val="1140"/>
+                        </a:lnSpc>
+                      </a:pPr>
+                      <a:r>
+                        <a:rPr kumimoji="1" lang="en-US" altLang="ja-JP" sz="1200" dirty="0" smtClean="0">
+                          <a:latin typeface="Arial"/>
+                          <a:cs typeface="Arial"/>
+                        </a:rPr>
+                        <a:t>Interest (%)</a:t>
+                      </a:r>
+                      <a:endParaRPr kumimoji="1" lang="ja-JP" altLang="en-US" sz="1200" dirty="0">
+                        <a:latin typeface="Arial"/>
+                        <a:cs typeface="Arial"/>
+                      </a:endParaRPr>
+                    </a:p>
+                  </a:txBody>
+                  <a:tcPr/>
+                </a:tc>
+              </a:tr>
+              <a:tr h="245520">
+                <a:tc>
+                  <a:txBody>
+                    <a:bodyPr/>
+                    <a:lstStyle/>
+                    <a:p>
+                      <a:pPr>
+                        <a:lnSpc>
+                          <a:spcPts val="1140"/>
+                        </a:lnSpc>
+                      </a:pPr>
+                      <a:r>
+                        <a:rPr kumimoji="1" lang="en-US" altLang="ja-JP" sz="1200" dirty="0" err="1" smtClean="0">
+                          <a:latin typeface="Arial"/>
+                          <a:cs typeface="Arial"/>
+                        </a:rPr>
+                        <a:t>SSLManager.java</a:t>
+                      </a:r>
+                      <a:endParaRPr kumimoji="1" lang="ja-JP" altLang="en-US" sz="1200" dirty="0">
+                        <a:latin typeface="Arial"/>
+                        <a:cs typeface="Arial"/>
+                      </a:endParaRPr>
+                    </a:p>
+                  </a:txBody>
+                  <a:tcPr>
+                    <a:lnR w="12700" cap="flat" cmpd="sng" algn="ctr">
+                      <a:solidFill>
+                        <a:scrgbClr r="0" g="0" b="0"/>
+                      </a:solidFill>
+                      <a:prstDash val="solid"/>
+                      <a:round/>
+                      <a:headEnd type="none" w="med" len="med"/>
+                      <a:tailEnd type="none" w="med" len="med"/>
+                    </a:lnR>
+                  </a:tcPr>
+                </a:tc>
+                <a:tc>
+                  <a:txBody>
+                    <a:bodyPr/>
+                    <a:lstStyle/>
+                    <a:p>
+                      <a:pPr algn="r">
+                        <a:lnSpc>
+                          <a:spcPts val="1140"/>
+                        </a:lnSpc>
+                      </a:pPr>
+                      <a:r>
+                        <a:rPr kumimoji="1" lang="en-US" altLang="ja-JP" sz="1200" dirty="0" smtClean="0">
+                          <a:latin typeface="Arial"/>
+                          <a:cs typeface="Arial"/>
+                        </a:rPr>
+                        <a:t>10.5</a:t>
+                      </a:r>
+                      <a:endParaRPr kumimoji="1" lang="ja-JP" altLang="en-US" sz="1200" dirty="0">
+                        <a:latin typeface="Arial"/>
+                        <a:cs typeface="Arial"/>
+                      </a:endParaRPr>
+                    </a:p>
+                  </a:txBody>
+                  <a:tcPr>
+                    <a:lnL w="12700" cap="flat" cmpd="sng" algn="ctr">
+                      <a:solidFill>
+                        <a:scrgbClr r="0" g="0" b="0"/>
+                      </a:solidFill>
+                      <a:prstDash val="solid"/>
+                      <a:round/>
+                      <a:headEnd type="none" w="med" len="med"/>
+                      <a:tailEnd type="none" w="med" len="med"/>
+                    </a:lnL>
+                  </a:tcPr>
+                </a:tc>
+              </a:tr>
+              <a:tr h="245520">
+                <a:tc>
+                  <a:txBody>
+                    <a:bodyPr/>
+                    <a:lstStyle/>
+                    <a:p>
+                      <a:pPr>
+                        <a:lnSpc>
+                          <a:spcPts val="1140"/>
+                        </a:lnSpc>
+                      </a:pPr>
+                      <a:r>
+                        <a:rPr kumimoji="1" lang="en-US" altLang="ja-JP" sz="1200" dirty="0" err="1" smtClean="0">
+                          <a:latin typeface="Arial"/>
+                          <a:cs typeface="Arial"/>
+                        </a:rPr>
+                        <a:t>MonitorGraph.java</a:t>
+                      </a:r>
+                      <a:endParaRPr kumimoji="1" lang="ja-JP" altLang="en-US" sz="1200" dirty="0">
+                        <a:latin typeface="Arial"/>
+                        <a:cs typeface="Arial"/>
+                      </a:endParaRPr>
+                    </a:p>
+                  </a:txBody>
+                  <a:tcPr>
+                    <a:lnR w="12700" cap="flat" cmpd="sng" algn="ctr">
+                      <a:solidFill>
+                        <a:scrgbClr r="0" g="0" b="0"/>
+                      </a:solidFill>
+                      <a:prstDash val="solid"/>
+                      <a:round/>
+                      <a:headEnd type="none" w="med" len="med"/>
+                      <a:tailEnd type="none" w="med" len="med"/>
+                    </a:lnR>
+                  </a:tcPr>
+                </a:tc>
+                <a:tc>
+                  <a:txBody>
+                    <a:bodyPr/>
+                    <a:lstStyle/>
+                    <a:p>
+                      <a:pPr algn="r">
+                        <a:lnSpc>
+                          <a:spcPts val="1140"/>
+                        </a:lnSpc>
+                      </a:pPr>
+                      <a:r>
+                        <a:rPr kumimoji="1" lang="en-US" altLang="ja-JP" sz="1200" dirty="0" smtClean="0">
+                          <a:latin typeface="Arial"/>
+                          <a:cs typeface="Arial"/>
+                        </a:rPr>
+                        <a:t>2.1</a:t>
+                      </a:r>
+                      <a:endParaRPr kumimoji="1" lang="ja-JP" altLang="en-US" sz="1200" dirty="0">
+                        <a:latin typeface="Arial"/>
+                        <a:cs typeface="Arial"/>
+                      </a:endParaRPr>
+                    </a:p>
+                  </a:txBody>
+                  <a:tcPr>
+                    <a:lnL w="12700" cap="flat" cmpd="sng" algn="ctr">
+                      <a:solidFill>
+                        <a:scrgbClr r="0" g="0" b="0"/>
+                      </a:solidFill>
+                      <a:prstDash val="solid"/>
+                      <a:round/>
+                      <a:headEnd type="none" w="med" len="med"/>
+                      <a:tailEnd type="none" w="med" len="med"/>
+                    </a:lnL>
+                  </a:tcPr>
+                </a:tc>
+              </a:tr>
+              <a:tr h="245520">
+                <a:tc>
+                  <a:txBody>
+                    <a:bodyPr/>
+                    <a:lstStyle/>
+                    <a:p>
+                      <a:pPr marL="0" indent="88900" algn="l" fontAlgn="b">
+                        <a:lnSpc>
+                          <a:spcPts val="1140"/>
+                        </a:lnSpc>
+                      </a:pPr>
+                      <a:r>
+                        <a:rPr lang="en-US" sz="1200" b="0" i="0" u="none" strike="noStrike" dirty="0" err="1" smtClean="0">
+                          <a:solidFill>
+                            <a:srgbClr val="000000"/>
+                          </a:solidFill>
+                          <a:effectLst/>
+                          <a:latin typeface="Arial"/>
+                          <a:cs typeface="Arial"/>
+                        </a:rPr>
+                        <a:t>ProxyControl.java</a:t>
+                      </a:r>
+                      <a:endParaRPr lang="en-US" sz="1200" b="0" i="0" u="none" strike="noStrike" dirty="0">
+                        <a:solidFill>
+                          <a:srgbClr val="000000"/>
+                        </a:solidFill>
+                        <a:effectLst/>
+                        <a:latin typeface="Arial"/>
+                        <a:cs typeface="Arial"/>
+                      </a:endParaRPr>
+                    </a:p>
+                  </a:txBody>
+                  <a:tcPr marL="12700" marR="12700" marT="12700" marB="0" anchor="b">
+                    <a:lnR w="12700" cap="flat" cmpd="sng" algn="ctr">
+                      <a:solidFill>
+                        <a:scrgbClr r="0" g="0" b="0"/>
+                      </a:solidFill>
+                      <a:prstDash val="solid"/>
+                      <a:round/>
+                      <a:headEnd type="none" w="med" len="med"/>
+                      <a:tailEnd type="none" w="med" len="med"/>
+                    </a:lnR>
+                  </a:tcPr>
+                </a:tc>
+                <a:tc>
+                  <a:txBody>
+                    <a:bodyPr/>
+                    <a:lstStyle/>
+                    <a:p>
+                      <a:pPr algn="r">
+                        <a:lnSpc>
+                          <a:spcPts val="1140"/>
+                        </a:lnSpc>
+                      </a:pPr>
+                      <a:r>
+                        <a:rPr kumimoji="1" lang="en-US" altLang="ja-JP" sz="1200" dirty="0" smtClean="0">
+                          <a:latin typeface="Arial"/>
+                          <a:cs typeface="Arial"/>
+                        </a:rPr>
+                        <a:t>8.3</a:t>
+                      </a:r>
+                      <a:endParaRPr kumimoji="1" lang="ja-JP" altLang="en-US" sz="1200" dirty="0">
+                        <a:latin typeface="Arial"/>
+                        <a:cs typeface="Arial"/>
+                      </a:endParaRPr>
+                    </a:p>
+                  </a:txBody>
+                  <a:tcPr>
+                    <a:lnL w="12700" cap="flat" cmpd="sng" algn="ctr">
+                      <a:solidFill>
+                        <a:scrgbClr r="0" g="0" b="0"/>
+                      </a:solidFill>
+                      <a:prstDash val="solid"/>
+                      <a:round/>
+                      <a:headEnd type="none" w="med" len="med"/>
+                      <a:tailEnd type="none" w="med" len="med"/>
+                    </a:lnL>
+                  </a:tcPr>
+                </a:tc>
+              </a:tr>
+              <a:tr h="245520">
+                <a:tc>
+                  <a:txBody>
+                    <a:bodyPr/>
+                    <a:lstStyle/>
+                    <a:p>
+                      <a:pPr marL="0" indent="88900" algn="l" fontAlgn="b">
+                        <a:lnSpc>
+                          <a:spcPts val="1140"/>
+                        </a:lnSpc>
+                      </a:pPr>
+                      <a:r>
+                        <a:rPr lang="en-US" sz="1200" b="0" i="0" u="none" strike="noStrike" dirty="0" err="1">
+                          <a:solidFill>
+                            <a:srgbClr val="000000"/>
+                          </a:solidFill>
+                          <a:effectLst/>
+                          <a:latin typeface="Arial"/>
+                          <a:cs typeface="Arial"/>
+                        </a:rPr>
+                        <a:t>SmtpPanel.java</a:t>
+                      </a:r>
+                      <a:endParaRPr lang="en-US" sz="1200" b="0" i="0" u="none" strike="noStrike" dirty="0">
+                        <a:solidFill>
+                          <a:srgbClr val="000000"/>
+                        </a:solidFill>
+                        <a:effectLst/>
+                        <a:latin typeface="Arial"/>
+                        <a:cs typeface="Arial"/>
+                      </a:endParaRPr>
+                    </a:p>
+                  </a:txBody>
+                  <a:tcPr marL="12700" marR="12700" marT="12700" marB="0" anchor="b">
+                    <a:lnR w="12700" cap="flat" cmpd="sng" algn="ctr">
+                      <a:solidFill>
+                        <a:scrgbClr r="0" g="0" b="0"/>
+                      </a:solidFill>
+                      <a:prstDash val="solid"/>
+                      <a:round/>
+                      <a:headEnd type="none" w="med" len="med"/>
+                      <a:tailEnd type="none" w="med" len="med"/>
+                    </a:lnR>
+                  </a:tcPr>
+                </a:tc>
+                <a:tc>
+                  <a:txBody>
+                    <a:bodyPr/>
+                    <a:lstStyle/>
+                    <a:p>
+                      <a:pPr algn="r">
+                        <a:lnSpc>
+                          <a:spcPts val="1140"/>
+                        </a:lnSpc>
+                      </a:pPr>
+                      <a:r>
+                        <a:rPr kumimoji="1" lang="en-US" altLang="ja-JP" sz="1200" dirty="0" smtClean="0">
+                          <a:latin typeface="Arial"/>
+                          <a:cs typeface="Arial"/>
+                        </a:rPr>
+                        <a:t>2.1</a:t>
+                      </a:r>
+                      <a:endParaRPr kumimoji="1" lang="ja-JP" altLang="en-US" sz="1200" dirty="0">
+                        <a:latin typeface="Arial"/>
+                        <a:cs typeface="Arial"/>
+                      </a:endParaRPr>
+                    </a:p>
+                  </a:txBody>
+                  <a:tcPr>
+                    <a:lnL w="12700" cap="flat" cmpd="sng" algn="ctr">
+                      <a:solidFill>
+                        <a:scrgbClr r="0" g="0" b="0"/>
+                      </a:solidFill>
+                      <a:prstDash val="solid"/>
+                      <a:round/>
+                      <a:headEnd type="none" w="med" len="med"/>
+                      <a:tailEnd type="none" w="med" len="med"/>
+                    </a:lnL>
+                  </a:tcPr>
+                </a:tc>
+              </a:tr>
+            </a:tbl>
+          </a:graphicData>
+        </a:graphic>
+      </p:graphicFrame>
+      <p:cxnSp>
+        <p:nvCxnSpPr>
+          <p:cNvPr id="21" name="Straight Arrow Connector 9"/>
+          <p:cNvCxnSpPr/>
+          <p:nvPr/>
+        </p:nvCxnSpPr>
+        <p:spPr>
+          <a:xfrm>
+            <a:off x="5029200" y="3276600"/>
+            <a:ext cx="277670" cy="0"/>
+          </a:xfrm>
+          <a:prstGeom prst="straightConnector1">
+            <a:avLst/>
+          </a:prstGeom>
+          <a:ln w="25400">
+            <a:solidFill>
+              <a:schemeClr val="tx1"/>
+            </a:solidFill>
+            <a:tailEnd type="arrow"/>
+          </a:ln>
+        </p:spPr>
+        <p:style>
+          <a:lnRef idx="1">
+            <a:schemeClr val="accent1"/>
+          </a:lnRef>
+          <a:fillRef idx="0">
+            <a:schemeClr val="accent1"/>
+          </a:fillRef>
+          <a:effectRef idx="0">
+            <a:schemeClr val="accent1"/>
+          </a:effectRef>
+          <a:fontRef idx="minor">
+            <a:schemeClr val="tx1"/>
+          </a:fontRef>
+        </p:style>
+      </p:cxnSp>
+      <p:cxnSp>
+        <p:nvCxnSpPr>
+          <p:cNvPr id="22" name="Straight Arrow Connector 9"/>
+          <p:cNvCxnSpPr/>
+          <p:nvPr/>
+        </p:nvCxnSpPr>
+        <p:spPr>
+          <a:xfrm>
+            <a:off x="6858000" y="3276600"/>
+            <a:ext cx="277670" cy="0"/>
+          </a:xfrm>
+          <a:prstGeom prst="straightConnector1">
+            <a:avLst/>
+          </a:prstGeom>
+          <a:ln w="25400">
+            <a:solidFill>
+              <a:schemeClr val="tx1"/>
+            </a:solidFill>
+            <a:tailEnd type="arrow"/>
+          </a:ln>
+        </p:spPr>
+        <p:style>
+          <a:lnRef idx="1">
+            <a:schemeClr val="accent1"/>
+          </a:lnRef>
+          <a:fillRef idx="0">
+            <a:schemeClr val="accent1"/>
+          </a:fillRef>
+          <a:effectRef idx="0">
+            <a:schemeClr val="accent1"/>
+          </a:effectRef>
+          <a:fontRef idx="minor">
+            <a:schemeClr val="tx1"/>
+          </a:fontRef>
+        </p:style>
+      </p:cxnSp>
+      <p:cxnSp>
+        <p:nvCxnSpPr>
+          <p:cNvPr id="23" name="Straight Arrow Connector 9"/>
+          <p:cNvCxnSpPr/>
+          <p:nvPr/>
+        </p:nvCxnSpPr>
+        <p:spPr>
+          <a:xfrm>
+            <a:off x="8674800" y="3276600"/>
+            <a:ext cx="316800" cy="0"/>
+          </a:xfrm>
+          <a:prstGeom prst="straightConnector1">
+            <a:avLst/>
+          </a:prstGeom>
+          <a:ln w="25400">
+            <a:solidFill>
+              <a:schemeClr val="tx1"/>
+            </a:solidFill>
+            <a:tailEnd type="arrow"/>
+          </a:ln>
+        </p:spPr>
+        <p:style>
+          <a:lnRef idx="1">
+            <a:schemeClr val="accent1"/>
+          </a:lnRef>
+          <a:fillRef idx="0">
+            <a:schemeClr val="accent1"/>
+          </a:fillRef>
+          <a:effectRef idx="0">
+            <a:schemeClr val="accent1"/>
+          </a:effectRef>
+          <a:fontRef idx="minor">
+            <a:schemeClr val="tx1"/>
+          </a:fontRef>
+        </p:style>
+      </p:cxnSp>
+    </p:spTree>
+    <p:extLst>
+      <p:ext uri="{BB962C8B-B14F-4D97-AF65-F5344CB8AC3E}">
+        <p14:creationId xmlns:p14="http://schemas.microsoft.com/office/powerpoint/2010/main" val="3152015016"/>
+      </p:ext>
+    </p:extLst>
+  </p:cSld>
+  <p:clrMapOvr>
+    <a:masterClrMapping/>
+  </p:clrMapOvr>
+  <p:timing>
+    <p:tnLst>
+      <p:par>
+        <p:cTn xmlns:p14="http://schemas.microsoft.com/office/powerpoint/2010/main" id="1" dur="indefinite" restart="never" nodeType="tmRoot"/>
+      </p:par>
+    </p:tnLst>
+  </p:timing>
+</p:sld>
+</file>
+
 <file path=ppt/theme/theme1.xml><?xml version="1.0" encoding="utf-8"?>
 <a:theme xmlns:a="http://schemas.openxmlformats.org/drawingml/2006/main" name="Office Theme">
   <a:themeElements>

</xml_diff>